<commit_message>
Slides updaed with notes
</commit_message>
<xml_diff>
--- a/Slides/2. Query Execution.pptx
+++ b/Slides/2. Query Execution.pptx
@@ -5,7 +5,7 @@
     <p:sldMasterId id="2147483648" r:id="rId1"/>
   </p:sldMasterIdLst>
   <p:notesMasterIdLst>
-    <p:notesMasterId r:id="rId25"/>
+    <p:notesMasterId r:id="rId26"/>
   </p:notesMasterIdLst>
   <p:sldIdLst>
     <p:sldId id="256" r:id="rId2"/>
@@ -31,6 +31,7 @@
     <p:sldId id="273" r:id="rId22"/>
     <p:sldId id="271" r:id="rId23"/>
     <p:sldId id="274" r:id="rId24"/>
+    <p:sldId id="282" r:id="rId25"/>
   </p:sldIdLst>
   <p:sldSz cx="12192000" cy="6858000"/>
   <p:notesSz cx="6858000" cy="9144000"/>
@@ -1487,8 +1488,8 @@
     <dgm:cxn modelId="{46994509-5C8E-492F-B35A-DF3CC15BC75D}" srcId="{47179704-B36E-43EE-A8E7-3C65146642B3}" destId="{AC504D79-5753-4100-AF16-7F4F5A98AA0C}" srcOrd="0" destOrd="0" parTransId="{1A5F847E-1F2B-4148-9193-BCFF04593C0F}" sibTransId="{37AC889E-5E62-4381-A909-A06E9208EE45}"/>
     <dgm:cxn modelId="{7BB7CA47-D793-4782-BFC5-BB7690881028}" srcId="{A688FFC1-229D-4906-8037-92FBAEDDA5D4}" destId="{B4B452B6-9DBE-4AC5-8ADB-F43BA3F489CA}" srcOrd="2" destOrd="0" parTransId="{65B7C0BA-4E1C-493C-B97A-DD4DF72DC4D0}" sibTransId="{9C64C543-5D3A-43B5-874D-098B56BA88E8}"/>
     <dgm:cxn modelId="{E27F034D-82BA-4DCA-A2A5-5AE0E5CCDDCC}" type="presOf" srcId="{A688FFC1-229D-4906-8037-92FBAEDDA5D4}" destId="{003FA6EB-E41C-427E-B3A7-B33C6D1A6409}" srcOrd="0" destOrd="0" presId="urn:microsoft.com/office/officeart/2005/8/layout/balance1"/>
+    <dgm:cxn modelId="{88938031-BA9A-4A49-A95D-6370EF3D73FA}" type="presOf" srcId="{381B9D55-AB07-4BB6-A7FA-6BAB38DC6611}" destId="{2BDF2C11-42FC-4D0D-84E7-5A028936F2ED}" srcOrd="0" destOrd="0" presId="urn:microsoft.com/office/officeart/2005/8/layout/balance1"/>
     <dgm:cxn modelId="{3B83173D-DB52-4471-90F0-EB73C6F571D1}" srcId="{A688FFC1-229D-4906-8037-92FBAEDDA5D4}" destId="{381B9D55-AB07-4BB6-A7FA-6BAB38DC6611}" srcOrd="0" destOrd="0" parTransId="{8B882347-5B73-4471-834A-3500B987C59B}" sibTransId="{D1742CDD-52E8-4D60-BFD9-254101B5BAB5}"/>
-    <dgm:cxn modelId="{88938031-BA9A-4A49-A95D-6370EF3D73FA}" type="presOf" srcId="{381B9D55-AB07-4BB6-A7FA-6BAB38DC6611}" destId="{2BDF2C11-42FC-4D0D-84E7-5A028936F2ED}" srcOrd="0" destOrd="0" presId="urn:microsoft.com/office/officeart/2005/8/layout/balance1"/>
     <dgm:cxn modelId="{597A167F-2BC7-4B40-B0F2-1E4361D94248}" type="presOf" srcId="{B4B452B6-9DBE-4AC5-8ADB-F43BA3F489CA}" destId="{59DFEEDD-8F3A-46D8-8E70-54C16210FEC5}" srcOrd="0" destOrd="0" presId="urn:microsoft.com/office/officeart/2005/8/layout/balance1"/>
     <dgm:cxn modelId="{B9C166AB-2BF2-433A-B7E8-A87DE619EA74}" srcId="{AC504D79-5753-4100-AF16-7F4F5A98AA0C}" destId="{1E1BD6B2-340B-4584-AC37-CFE3D3813FF3}" srcOrd="1" destOrd="0" parTransId="{8E260586-5D10-4577-9CBE-DF6CB90EECE2}" sibTransId="{AA099CFE-B85C-4434-8FC5-11F177FBEF9F}"/>
     <dgm:cxn modelId="{D6F668C4-5C73-4A4A-B9F3-8EF5F70CDAEB}" srcId="{47179704-B36E-43EE-A8E7-3C65146642B3}" destId="{A688FFC1-229D-4906-8037-92FBAEDDA5D4}" srcOrd="1" destOrd="0" parTransId="{F5247E29-1996-4103-8A4B-4E8C6DC97C50}" sibTransId="{AD02AB81-96E7-4779-ADC2-C406A7EDBBC1}"/>
@@ -6401,7 +6402,7 @@
           <a:p>
             <a:fld id="{C33E546B-25B4-4054-B726-50ABAEF81226}" type="datetimeFigureOut">
               <a:rPr lang="en-GB" smtClean="0"/>
-              <a:t>21/01/2016</a:t>
+              <a:t>11/02/2016</a:t>
             </a:fld>
             <a:endParaRPr lang="en-GB"/>
           </a:p>
@@ -6966,7 +6967,7 @@
           <a:p>
             <a:fld id="{8204E7FD-169F-464A-8003-B2893D8D8FF1}" type="datetimeFigureOut">
               <a:rPr lang="en-GB" smtClean="0"/>
-              <a:t>21/01/2016</a:t>
+              <a:t>11/02/2016</a:t>
             </a:fld>
             <a:endParaRPr lang="en-GB"/>
           </a:p>
@@ -7136,7 +7137,7 @@
           <a:p>
             <a:fld id="{8204E7FD-169F-464A-8003-B2893D8D8FF1}" type="datetimeFigureOut">
               <a:rPr lang="en-GB" smtClean="0"/>
-              <a:t>21/01/2016</a:t>
+              <a:t>11/02/2016</a:t>
             </a:fld>
             <a:endParaRPr lang="en-GB"/>
           </a:p>
@@ -7316,7 +7317,7 @@
           <a:p>
             <a:fld id="{8204E7FD-169F-464A-8003-B2893D8D8FF1}" type="datetimeFigureOut">
               <a:rPr lang="en-GB" smtClean="0"/>
-              <a:t>21/01/2016</a:t>
+              <a:t>11/02/2016</a:t>
             </a:fld>
             <a:endParaRPr lang="en-GB"/>
           </a:p>
@@ -7486,7 +7487,7 @@
           <a:p>
             <a:fld id="{8204E7FD-169F-464A-8003-B2893D8D8FF1}" type="datetimeFigureOut">
               <a:rPr lang="en-GB" smtClean="0"/>
-              <a:t>21/01/2016</a:t>
+              <a:t>11/02/2016</a:t>
             </a:fld>
             <a:endParaRPr lang="en-GB"/>
           </a:p>
@@ -7732,7 +7733,7 @@
           <a:p>
             <a:fld id="{8204E7FD-169F-464A-8003-B2893D8D8FF1}" type="datetimeFigureOut">
               <a:rPr lang="en-GB" smtClean="0"/>
-              <a:t>21/01/2016</a:t>
+              <a:t>11/02/2016</a:t>
             </a:fld>
             <a:endParaRPr lang="en-GB"/>
           </a:p>
@@ -7964,7 +7965,7 @@
           <a:p>
             <a:fld id="{8204E7FD-169F-464A-8003-B2893D8D8FF1}" type="datetimeFigureOut">
               <a:rPr lang="en-GB" smtClean="0"/>
-              <a:t>21/01/2016</a:t>
+              <a:t>11/02/2016</a:t>
             </a:fld>
             <a:endParaRPr lang="en-GB"/>
           </a:p>
@@ -8331,7 +8332,7 @@
           <a:p>
             <a:fld id="{8204E7FD-169F-464A-8003-B2893D8D8FF1}" type="datetimeFigureOut">
               <a:rPr lang="en-GB" smtClean="0"/>
-              <a:t>21/01/2016</a:t>
+              <a:t>11/02/2016</a:t>
             </a:fld>
             <a:endParaRPr lang="en-GB"/>
           </a:p>
@@ -8449,7 +8450,7 @@
           <a:p>
             <a:fld id="{8204E7FD-169F-464A-8003-B2893D8D8FF1}" type="datetimeFigureOut">
               <a:rPr lang="en-GB" smtClean="0"/>
-              <a:t>21/01/2016</a:t>
+              <a:t>11/02/2016</a:t>
             </a:fld>
             <a:endParaRPr lang="en-GB"/>
           </a:p>
@@ -8544,7 +8545,7 @@
           <a:p>
             <a:fld id="{8204E7FD-169F-464A-8003-B2893D8D8FF1}" type="datetimeFigureOut">
               <a:rPr lang="en-GB" smtClean="0"/>
-              <a:t>21/01/2016</a:t>
+              <a:t>11/02/2016</a:t>
             </a:fld>
             <a:endParaRPr lang="en-GB"/>
           </a:p>
@@ -8821,7 +8822,7 @@
           <a:p>
             <a:fld id="{8204E7FD-169F-464A-8003-B2893D8D8FF1}" type="datetimeFigureOut">
               <a:rPr lang="en-GB" smtClean="0"/>
-              <a:t>21/01/2016</a:t>
+              <a:t>11/02/2016</a:t>
             </a:fld>
             <a:endParaRPr lang="en-GB"/>
           </a:p>
@@ -9074,7 +9075,7 @@
           <a:p>
             <a:fld id="{8204E7FD-169F-464A-8003-B2893D8D8FF1}" type="datetimeFigureOut">
               <a:rPr lang="en-GB" smtClean="0"/>
-              <a:t>21/01/2016</a:t>
+              <a:t>11/02/2016</a:t>
             </a:fld>
             <a:endParaRPr lang="en-GB"/>
           </a:p>
@@ -9287,7 +9288,7 @@
           <a:p>
             <a:fld id="{8204E7FD-169F-464A-8003-B2893D8D8FF1}" type="datetimeFigureOut">
               <a:rPr lang="en-GB" smtClean="0"/>
-              <a:t>21/01/2016</a:t>
+              <a:t>11/02/2016</a:t>
             </a:fld>
             <a:endParaRPr lang="en-GB"/>
           </a:p>
@@ -9781,7 +9782,7 @@
           <a:p>
             <a:r>
               <a:rPr lang="en-GB" dirty="0" smtClean="0"/>
-              <a:t>Demo</a:t>
+              <a:t>Screenshot</a:t>
             </a:r>
             <a:endParaRPr lang="en-GB" dirty="0"/>
           </a:p>
@@ -10034,11 +10035,11 @@
   <p:clrMapOvr>
     <a:masterClrMapping/>
   </p:clrMapOvr>
-  <mc:AlternateContent xmlns:mc="http://schemas.openxmlformats.org/markup-compatibility/2006">
-    <mc:Choice xmlns:p14="http://schemas.microsoft.com/office/powerpoint/2010/main" Requires="p14">
+  <mc:AlternateContent xmlns:mc="http://schemas.openxmlformats.org/markup-compatibility/2006" xmlns:p14="http://schemas.microsoft.com/office/powerpoint/2010/main">
+    <mc:Choice Requires="p14">
       <p:transition spd="slow" p14:dur="2000"/>
     </mc:Choice>
-    <mc:Fallback>
+    <mc:Fallback xmlns="">
       <p:transition spd="slow"/>
     </mc:Fallback>
   </mc:AlternateContent>
@@ -10233,11 +10234,11 @@
   <p:clrMapOvr>
     <a:masterClrMapping/>
   </p:clrMapOvr>
-  <mc:AlternateContent xmlns:mc="http://schemas.openxmlformats.org/markup-compatibility/2006">
-    <mc:Choice xmlns:p14="http://schemas.microsoft.com/office/powerpoint/2010/main" Requires="p14">
+  <mc:AlternateContent xmlns:mc="http://schemas.openxmlformats.org/markup-compatibility/2006" xmlns:p14="http://schemas.microsoft.com/office/powerpoint/2010/main">
+    <mc:Choice Requires="p14">
       <p:transition spd="slow" p14:dur="2000"/>
     </mc:Choice>
-    <mc:Fallback>
+    <mc:Fallback xmlns="">
       <p:transition spd="slow"/>
     </mc:Fallback>
   </mc:AlternateContent>
@@ -10350,11 +10351,11 @@
   <p:clrMapOvr>
     <a:masterClrMapping/>
   </p:clrMapOvr>
-  <mc:AlternateContent xmlns:mc="http://schemas.openxmlformats.org/markup-compatibility/2006">
-    <mc:Choice xmlns:p14="http://schemas.microsoft.com/office/powerpoint/2010/main" Requires="p14">
+  <mc:AlternateContent xmlns:mc="http://schemas.openxmlformats.org/markup-compatibility/2006" xmlns:p14="http://schemas.microsoft.com/office/powerpoint/2010/main">
+    <mc:Choice Requires="p14">
       <p:transition spd="slow" p14:dur="2000"/>
     </mc:Choice>
-    <mc:Fallback>
+    <mc:Fallback xmlns="">
       <p:transition spd="slow"/>
     </mc:Fallback>
   </mc:AlternateContent>
@@ -10432,11 +10433,7 @@
             <a:pPr lvl="1"/>
             <a:r>
               <a:rPr lang="en-GB" dirty="0" smtClean="0"/>
-              <a:t>Fast for small </a:t>
-            </a:r>
-            <a:r>
-              <a:rPr lang="en-GB" dirty="0" smtClean="0"/>
-              <a:t>datasets</a:t>
+              <a:t>Fast for small datasets</a:t>
             </a:r>
           </a:p>
           <a:p>
@@ -10452,7 +10449,6 @@
               <a:rPr lang="en-GB" dirty="0" smtClean="0"/>
               <a:t>Bad is wrong estimates</a:t>
             </a:r>
-            <a:endParaRPr lang="en-GB" dirty="0" smtClean="0"/>
           </a:p>
           <a:p>
             <a:r>
@@ -10980,11 +10976,11 @@
   <p:clrMapOvr>
     <a:masterClrMapping/>
   </p:clrMapOvr>
-  <mc:AlternateContent xmlns:mc="http://schemas.openxmlformats.org/markup-compatibility/2006">
-    <mc:Choice xmlns:p14="http://schemas.microsoft.com/office/powerpoint/2010/main" Requires="p14">
+  <mc:AlternateContent xmlns:mc="http://schemas.openxmlformats.org/markup-compatibility/2006" xmlns:p14="http://schemas.microsoft.com/office/powerpoint/2010/main">
+    <mc:Choice Requires="p14">
       <p:transition spd="slow" p14:dur="2000"/>
     </mc:Choice>
-    <mc:Fallback>
+    <mc:Fallback xmlns="">
       <p:transition spd="slow"/>
     </mc:Fallback>
   </mc:AlternateContent>
@@ -11408,6 +11404,106 @@
 </p:sld>
 </file>
 
+<file path=ppt/slides/slide24.xml><?xml version="1.0" encoding="utf-8"?>
+<p:sld xmlns:a="http://schemas.openxmlformats.org/drawingml/2006/main" xmlns:r="http://schemas.openxmlformats.org/officeDocument/2006/relationships" xmlns:p="http://schemas.openxmlformats.org/presentationml/2006/main">
+  <p:cSld>
+    <p:spTree>
+      <p:nvGrpSpPr>
+        <p:cNvPr id="1" name=""/>
+        <p:cNvGrpSpPr/>
+        <p:nvPr/>
+      </p:nvGrpSpPr>
+      <p:grpSpPr>
+        <a:xfrm>
+          <a:off x="0" y="0"/>
+          <a:ext cx="0" cy="0"/>
+          <a:chOff x="0" y="0"/>
+          <a:chExt cx="0" cy="0"/>
+        </a:xfrm>
+      </p:grpSpPr>
+      <p:sp>
+        <p:nvSpPr>
+          <p:cNvPr id="2" name="Title 1"/>
+          <p:cNvSpPr>
+            <a:spLocks noGrp="1"/>
+          </p:cNvSpPr>
+          <p:nvPr>
+            <p:ph type="title"/>
+          </p:nvPr>
+        </p:nvSpPr>
+        <p:spPr/>
+        <p:txBody>
+          <a:bodyPr/>
+          <a:lstStyle/>
+          <a:p>
+            <a:r>
+              <a:rPr lang="en-GB" dirty="0" smtClean="0"/>
+              <a:t>Notes</a:t>
+            </a:r>
+            <a:endParaRPr lang="en-GB" dirty="0"/>
+          </a:p>
+        </p:txBody>
+      </p:sp>
+      <p:sp>
+        <p:nvSpPr>
+          <p:cNvPr id="3" name="Content Placeholder 2"/>
+          <p:cNvSpPr>
+            <a:spLocks noGrp="1"/>
+          </p:cNvSpPr>
+          <p:nvPr>
+            <p:ph idx="1"/>
+          </p:nvPr>
+        </p:nvSpPr>
+        <p:spPr/>
+        <p:txBody>
+          <a:bodyPr/>
+          <a:lstStyle/>
+          <a:p>
+            <a:r>
+              <a:rPr lang="en-GB" dirty="0" smtClean="0"/>
+              <a:t>Threshold Cost</a:t>
+            </a:r>
+          </a:p>
+          <a:p>
+            <a:r>
+              <a:rPr lang="en-GB" dirty="0" err="1" smtClean="0"/>
+              <a:t>Paramistasion</a:t>
+            </a:r>
+            <a:endParaRPr lang="en-GB" dirty="0" smtClean="0"/>
+          </a:p>
+          <a:p>
+            <a:r>
+              <a:rPr lang="en-GB" dirty="0" smtClean="0"/>
+              <a:t>SET options</a:t>
+            </a:r>
+          </a:p>
+          <a:p>
+            <a:r>
+              <a:rPr lang="en-GB" dirty="0" smtClean="0"/>
+              <a:t>Linked Servers</a:t>
+            </a:r>
+          </a:p>
+          <a:p>
+            <a:endParaRPr lang="en-GB" dirty="0" smtClean="0"/>
+          </a:p>
+          <a:p>
+            <a:endParaRPr lang="en-GB" dirty="0"/>
+          </a:p>
+        </p:txBody>
+      </p:sp>
+    </p:spTree>
+    <p:extLst>
+      <p:ext uri="{BB962C8B-B14F-4D97-AF65-F5344CB8AC3E}">
+        <p14:creationId xmlns:p14="http://schemas.microsoft.com/office/powerpoint/2010/main" val="3284504710"/>
+      </p:ext>
+    </p:extLst>
+  </p:cSld>
+  <p:clrMapOvr>
+    <a:masterClrMapping/>
+  </p:clrMapOvr>
+</p:sld>
+</file>
+
 <file path=ppt/slides/slide3.xml><?xml version="1.0" encoding="utf-8"?>
 <p:sld xmlns:a="http://schemas.openxmlformats.org/drawingml/2006/main" xmlns:r="http://schemas.openxmlformats.org/officeDocument/2006/relationships" xmlns:p="http://schemas.openxmlformats.org/presentationml/2006/main">
   <p:cSld>
@@ -11646,11 +11742,11 @@
   <p:clrMapOvr>
     <a:masterClrMapping/>
   </p:clrMapOvr>
-  <mc:AlternateContent xmlns:mc="http://schemas.openxmlformats.org/markup-compatibility/2006">
-    <mc:Choice xmlns:p14="http://schemas.microsoft.com/office/powerpoint/2010/main" Requires="p14">
+  <mc:AlternateContent xmlns:mc="http://schemas.openxmlformats.org/markup-compatibility/2006" xmlns:p14="http://schemas.microsoft.com/office/powerpoint/2010/main">
+    <mc:Choice Requires="p14">
       <p:transition spd="slow" p14:dur="2000"/>
     </mc:Choice>
-    <mc:Fallback>
+    <mc:Fallback xmlns="">
       <p:transition spd="slow"/>
     </mc:Fallback>
   </mc:AlternateContent>
@@ -11784,11 +11880,11 @@
   <p:clrMapOvr>
     <a:masterClrMapping/>
   </p:clrMapOvr>
-  <mc:AlternateContent xmlns:mc="http://schemas.openxmlformats.org/markup-compatibility/2006">
-    <mc:Choice xmlns:p14="http://schemas.microsoft.com/office/powerpoint/2010/main" Requires="p14">
+  <mc:AlternateContent xmlns:mc="http://schemas.openxmlformats.org/markup-compatibility/2006" xmlns:p14="http://schemas.microsoft.com/office/powerpoint/2010/main">
+    <mc:Choice Requires="p14">
       <p:transition spd="slow" p14:dur="2000"/>
     </mc:Choice>
-    <mc:Fallback>
+    <mc:Fallback xmlns="">
       <p:transition spd="slow"/>
     </mc:Fallback>
   </mc:AlternateContent>
@@ -11982,8 +12078,17 @@
           <a:p>
             <a:r>
               <a:rPr lang="en-GB" dirty="0" smtClean="0"/>
-              <a:t>Manually update with UPDATE STATISTICS</a:t>
-            </a:r>
+              <a:t>Manually update with UPDATE </a:t>
+            </a:r>
+            <a:r>
+              <a:rPr lang="en-GB" dirty="0" smtClean="0"/>
+              <a:t>STATISTICS</a:t>
+            </a:r>
+          </a:p>
+          <a:p>
+            <a:pPr marL="0" indent="0">
+              <a:buNone/>
+            </a:pPr>
             <a:endParaRPr lang="en-GB" dirty="0"/>
           </a:p>
         </p:txBody>
@@ -12035,7 +12140,7 @@
           <a:p>
             <a:r>
               <a:rPr lang="en-GB" dirty="0" smtClean="0"/>
-              <a:t>Demo</a:t>
+              <a:t>Screenshot</a:t>
             </a:r>
             <a:endParaRPr lang="en-GB" dirty="0"/>
           </a:p>
@@ -12058,7 +12163,17 @@
           <a:p>
             <a:r>
               <a:rPr lang="en-GB" dirty="0" smtClean="0"/>
-              <a:t>Create demo of DBCC SHOWSTATISTICS</a:t>
+              <a:t>Create demo of DBCC </a:t>
+            </a:r>
+            <a:r>
+              <a:rPr lang="en-GB" dirty="0" smtClean="0"/>
+              <a:t>SHOWSTATISTICS</a:t>
+            </a:r>
+          </a:p>
+          <a:p>
+            <a:r>
+              <a:rPr lang="en-GB" dirty="0" smtClean="0"/>
+              <a:t>Histogram</a:t>
             </a:r>
             <a:endParaRPr lang="en-GB" dirty="0"/>
           </a:p>
@@ -12184,7 +12299,11 @@
           <a:p>
             <a:r>
               <a:rPr lang="en-GB" dirty="0" smtClean="0"/>
-              <a:t>Skewed statistics leads to uneven threads</a:t>
+              <a:t>Skewed statistics leads to uneven </a:t>
+            </a:r>
+            <a:r>
+              <a:rPr lang="en-GB" dirty="0" smtClean="0"/>
+              <a:t>threads (CXPACKET)</a:t>
             </a:r>
             <a:endParaRPr lang="en-GB" dirty="0"/>
           </a:p>

</xml_diff>